<commit_message>
Alterações dos slides da apresentação individual
</commit_message>
<xml_diff>
--- a/Documentos/4. Apresentação Individual/Ana/Apresentação.pptx
+++ b/Documentos/4. Apresentação Individual/Ana/Apresentação.pptx
@@ -3864,7 +3864,7 @@
           <a:p>
             <a:fld id="{86C5BD13-61EC-4414-AAF8-21C9A9ACCC39}" type="datetimeFigureOut">
               <a:rPr lang="pt-PT" smtClean="0"/>
-              <a:t>24/04/2018</a:t>
+              <a:t>26/04/2018</a:t>
             </a:fld>
             <a:endParaRPr lang="pt-PT"/>
           </a:p>
@@ -4034,7 +4034,7 @@
           <a:p>
             <a:fld id="{86C5BD13-61EC-4414-AAF8-21C9A9ACCC39}" type="datetimeFigureOut">
               <a:rPr lang="pt-PT" smtClean="0"/>
-              <a:t>24/04/2018</a:t>
+              <a:t>26/04/2018</a:t>
             </a:fld>
             <a:endParaRPr lang="pt-PT"/>
           </a:p>
@@ -4214,7 +4214,7 @@
           <a:p>
             <a:fld id="{86C5BD13-61EC-4414-AAF8-21C9A9ACCC39}" type="datetimeFigureOut">
               <a:rPr lang="pt-PT" smtClean="0"/>
-              <a:t>24/04/2018</a:t>
+              <a:t>26/04/2018</a:t>
             </a:fld>
             <a:endParaRPr lang="pt-PT"/>
           </a:p>
@@ -4384,7 +4384,7 @@
           <a:p>
             <a:fld id="{86C5BD13-61EC-4414-AAF8-21C9A9ACCC39}" type="datetimeFigureOut">
               <a:rPr lang="pt-PT" smtClean="0"/>
-              <a:t>24/04/2018</a:t>
+              <a:t>26/04/2018</a:t>
             </a:fld>
             <a:endParaRPr lang="pt-PT"/>
           </a:p>
@@ -4652,7 +4652,7 @@
           <a:p>
             <a:fld id="{86C5BD13-61EC-4414-AAF8-21C9A9ACCC39}" type="datetimeFigureOut">
               <a:rPr lang="pt-PT" smtClean="0"/>
-              <a:t>24/04/2018</a:t>
+              <a:t>26/04/2018</a:t>
             </a:fld>
             <a:endParaRPr lang="pt-PT"/>
           </a:p>
@@ -4884,7 +4884,7 @@
           <a:p>
             <a:fld id="{86C5BD13-61EC-4414-AAF8-21C9A9ACCC39}" type="datetimeFigureOut">
               <a:rPr lang="pt-PT" smtClean="0"/>
-              <a:t>24/04/2018</a:t>
+              <a:t>26/04/2018</a:t>
             </a:fld>
             <a:endParaRPr lang="pt-PT"/>
           </a:p>
@@ -5243,7 +5243,7 @@
           <a:p>
             <a:fld id="{86C5BD13-61EC-4414-AAF8-21C9A9ACCC39}" type="datetimeFigureOut">
               <a:rPr lang="pt-PT" smtClean="0"/>
-              <a:t>24/04/2018</a:t>
+              <a:t>26/04/2018</a:t>
             </a:fld>
             <a:endParaRPr lang="pt-PT"/>
           </a:p>
@@ -5384,7 +5384,7 @@
           <a:p>
             <a:fld id="{86C5BD13-61EC-4414-AAF8-21C9A9ACCC39}" type="datetimeFigureOut">
               <a:rPr lang="pt-PT" smtClean="0"/>
-              <a:t>24/04/2018</a:t>
+              <a:t>26/04/2018</a:t>
             </a:fld>
             <a:endParaRPr lang="pt-PT"/>
           </a:p>
@@ -5479,7 +5479,7 @@
           <a:p>
             <a:fld id="{86C5BD13-61EC-4414-AAF8-21C9A9ACCC39}" type="datetimeFigureOut">
               <a:rPr lang="pt-PT" smtClean="0"/>
-              <a:t>24/04/2018</a:t>
+              <a:t>26/04/2018</a:t>
             </a:fld>
             <a:endParaRPr lang="pt-PT"/>
           </a:p>
@@ -5836,7 +5836,7 @@
           <a:p>
             <a:fld id="{86C5BD13-61EC-4414-AAF8-21C9A9ACCC39}" type="datetimeFigureOut">
               <a:rPr lang="pt-PT" smtClean="0"/>
-              <a:t>24/04/2018</a:t>
+              <a:t>26/04/2018</a:t>
             </a:fld>
             <a:endParaRPr lang="pt-PT"/>
           </a:p>
@@ -6195,7 +6195,7 @@
           <a:p>
             <a:fld id="{86C5BD13-61EC-4414-AAF8-21C9A9ACCC39}" type="datetimeFigureOut">
               <a:rPr lang="pt-PT" smtClean="0"/>
-              <a:t>24/04/2018</a:t>
+              <a:t>26/04/2018</a:t>
             </a:fld>
             <a:endParaRPr lang="pt-PT"/>
           </a:p>
@@ -6438,7 +6438,7 @@
           <a:p>
             <a:fld id="{86C5BD13-61EC-4414-AAF8-21C9A9ACCC39}" type="datetimeFigureOut">
               <a:rPr lang="pt-PT" smtClean="0"/>
-              <a:t>24/04/2018</a:t>
+              <a:t>26/04/2018</a:t>
             </a:fld>
             <a:endParaRPr lang="pt-PT"/>
           </a:p>
@@ -8384,52 +8384,6 @@
           <a:chExt cx="0" cy="0"/>
         </a:xfrm>
       </p:grpSpPr>
-      <p:pic>
-        <p:nvPicPr>
-          <p:cNvPr id="11" name="Imagem 10">
-            <a:extLst>
-              <a:ext uri="{FF2B5EF4-FFF2-40B4-BE49-F238E27FC236}">
-                <a16:creationId xmlns:a16="http://schemas.microsoft.com/office/drawing/2014/main" id="{0BEC3353-C46A-4676-8C32-E8D99F255E18}"/>
-              </a:ext>
-            </a:extLst>
-          </p:cNvPr>
-          <p:cNvPicPr>
-            <a:picLocks noChangeAspect="1"/>
-          </p:cNvPicPr>
-          <p:nvPr/>
-        </p:nvPicPr>
-        <p:blipFill>
-          <a:blip r:embed="rId2">
-            <a:extLst>
-              <a:ext uri="{28A0092B-C50C-407E-A947-70E740481C1C}">
-                <a14:useLocalDpi xmlns:a14="http://schemas.microsoft.com/office/drawing/2010/main" val="0"/>
-              </a:ext>
-            </a:extLst>
-          </a:blip>
-          <a:stretch>
-            <a:fillRect/>
-          </a:stretch>
-        </p:blipFill>
-        <p:spPr>
-          <a:xfrm>
-            <a:off x="2332981" y="2342624"/>
-            <a:ext cx="4478038" cy="3955865"/>
-          </a:xfrm>
-          <a:prstGeom prst="rect">
-            <a:avLst/>
-          </a:prstGeom>
-          <a:ln>
-            <a:noFill/>
-          </a:ln>
-          <a:effectLst>
-            <a:outerShdw blurRad="292100" dist="139700" dir="2700000" algn="tl" rotWithShape="0">
-              <a:srgbClr val="333333">
-                <a:alpha val="65000"/>
-              </a:srgbClr>
-            </a:outerShdw>
-          </a:effectLst>
-        </p:spPr>
-      </p:pic>
       <p:sp>
         <p:nvSpPr>
           <p:cNvPr id="19" name="Retângulo 18">
@@ -8615,231 +8569,6 @@
       </p:transition>
     </mc:Fallback>
   </mc:AlternateContent>
-  <p:timing>
-    <p:tnLst>
-      <p:par>
-        <p:cTn id="1" dur="indefinite" restart="never" nodeType="tmRoot">
-          <p:childTnLst>
-            <p:seq concurrent="1" nextAc="seek">
-              <p:cTn id="2" dur="indefinite" nodeType="mainSeq">
-                <p:childTnLst>
-                  <p:par>
-                    <p:cTn id="3" fill="hold">
-                      <p:stCondLst>
-                        <p:cond delay="indefinite"/>
-                      </p:stCondLst>
-                      <p:childTnLst>
-                        <p:par>
-                          <p:cTn id="4" fill="hold">
-                            <p:stCondLst>
-                              <p:cond delay="0"/>
-                            </p:stCondLst>
-                            <p:childTnLst>
-                              <p:par>
-                                <p:cTn id="5" presetID="1" presetClass="exit" presetSubtype="0" fill="hold" grpId="0" nodeType="clickEffect">
-                                  <p:stCondLst>
-                                    <p:cond delay="0"/>
-                                  </p:stCondLst>
-                                  <p:childTnLst>
-                                    <p:set>
-                                      <p:cBhvr>
-                                        <p:cTn id="6" dur="1" fill="hold">
-                                          <p:stCondLst>
-                                            <p:cond delay="0"/>
-                                          </p:stCondLst>
-                                        </p:cTn>
-                                        <p:tgtEl>
-                                          <p:spTgt spid="7">
-                                            <p:txEl>
-                                              <p:pRg st="0" end="0"/>
-                                            </p:txEl>
-                                          </p:spTgt>
-                                        </p:tgtEl>
-                                        <p:attrNameLst>
-                                          <p:attrName>style.visibility</p:attrName>
-                                        </p:attrNameLst>
-                                      </p:cBhvr>
-                                      <p:to>
-                                        <p:strVal val="hidden"/>
-                                      </p:to>
-                                    </p:set>
-                                  </p:childTnLst>
-                                </p:cTn>
-                              </p:par>
-                              <p:par>
-                                <p:cTn id="7" presetID="1" presetClass="exit" presetSubtype="0" fill="hold" grpId="0" nodeType="withEffect">
-                                  <p:stCondLst>
-                                    <p:cond delay="0"/>
-                                  </p:stCondLst>
-                                  <p:childTnLst>
-                                    <p:set>
-                                      <p:cBhvr>
-                                        <p:cTn id="8" dur="1" fill="hold">
-                                          <p:stCondLst>
-                                            <p:cond delay="0"/>
-                                          </p:stCondLst>
-                                        </p:cTn>
-                                        <p:tgtEl>
-                                          <p:spTgt spid="7">
-                                            <p:txEl>
-                                              <p:pRg st="2" end="2"/>
-                                            </p:txEl>
-                                          </p:spTgt>
-                                        </p:tgtEl>
-                                        <p:attrNameLst>
-                                          <p:attrName>style.visibility</p:attrName>
-                                        </p:attrNameLst>
-                                      </p:cBhvr>
-                                      <p:to>
-                                        <p:strVal val="hidden"/>
-                                      </p:to>
-                                    </p:set>
-                                  </p:childTnLst>
-                                </p:cTn>
-                              </p:par>
-                              <p:par>
-                                <p:cTn id="9" presetID="1" presetClass="exit" presetSubtype="0" fill="hold" grpId="0" nodeType="withEffect">
-                                  <p:stCondLst>
-                                    <p:cond delay="0"/>
-                                  </p:stCondLst>
-                                  <p:childTnLst>
-                                    <p:set>
-                                      <p:cBhvr>
-                                        <p:cTn id="10" dur="1" fill="hold">
-                                          <p:stCondLst>
-                                            <p:cond delay="0"/>
-                                          </p:stCondLst>
-                                        </p:cTn>
-                                        <p:tgtEl>
-                                          <p:spTgt spid="7">
-                                            <p:txEl>
-                                              <p:pRg st="4" end="4"/>
-                                            </p:txEl>
-                                          </p:spTgt>
-                                        </p:tgtEl>
-                                        <p:attrNameLst>
-                                          <p:attrName>style.visibility</p:attrName>
-                                        </p:attrNameLst>
-                                      </p:cBhvr>
-                                      <p:to>
-                                        <p:strVal val="hidden"/>
-                                      </p:to>
-                                    </p:set>
-                                  </p:childTnLst>
-                                </p:cTn>
-                              </p:par>
-                              <p:par>
-                                <p:cTn id="11" presetID="53" presetClass="entr" presetSubtype="16" fill="hold" nodeType="withEffect">
-                                  <p:stCondLst>
-                                    <p:cond delay="0"/>
-                                  </p:stCondLst>
-                                  <p:childTnLst>
-                                    <p:set>
-                                      <p:cBhvr>
-                                        <p:cTn id="12" dur="1" fill="hold">
-                                          <p:stCondLst>
-                                            <p:cond delay="0"/>
-                                          </p:stCondLst>
-                                        </p:cTn>
-                                        <p:tgtEl>
-                                          <p:spTgt spid="11"/>
-                                        </p:tgtEl>
-                                        <p:attrNameLst>
-                                          <p:attrName>style.visibility</p:attrName>
-                                        </p:attrNameLst>
-                                      </p:cBhvr>
-                                      <p:to>
-                                        <p:strVal val="visible"/>
-                                      </p:to>
-                                    </p:set>
-                                    <p:anim calcmode="lin" valueType="num">
-                                      <p:cBhvr>
-                                        <p:cTn id="13" dur="1000" fill="hold"/>
-                                        <p:tgtEl>
-                                          <p:spTgt spid="11"/>
-                                        </p:tgtEl>
-                                        <p:attrNameLst>
-                                          <p:attrName>ppt_w</p:attrName>
-                                        </p:attrNameLst>
-                                      </p:cBhvr>
-                                      <p:tavLst>
-                                        <p:tav tm="0">
-                                          <p:val>
-                                            <p:fltVal val="0"/>
-                                          </p:val>
-                                        </p:tav>
-                                        <p:tav tm="100000">
-                                          <p:val>
-                                            <p:strVal val="#ppt_w"/>
-                                          </p:val>
-                                        </p:tav>
-                                      </p:tavLst>
-                                    </p:anim>
-                                    <p:anim calcmode="lin" valueType="num">
-                                      <p:cBhvr>
-                                        <p:cTn id="14" dur="1000" fill="hold"/>
-                                        <p:tgtEl>
-                                          <p:spTgt spid="11"/>
-                                        </p:tgtEl>
-                                        <p:attrNameLst>
-                                          <p:attrName>ppt_h</p:attrName>
-                                        </p:attrNameLst>
-                                      </p:cBhvr>
-                                      <p:tavLst>
-                                        <p:tav tm="0">
-                                          <p:val>
-                                            <p:fltVal val="0"/>
-                                          </p:val>
-                                        </p:tav>
-                                        <p:tav tm="100000">
-                                          <p:val>
-                                            <p:strVal val="#ppt_h"/>
-                                          </p:val>
-                                        </p:tav>
-                                      </p:tavLst>
-                                    </p:anim>
-                                    <p:animEffect transition="in" filter="fade">
-                                      <p:cBhvr>
-                                        <p:cTn id="15" dur="1000"/>
-                                        <p:tgtEl>
-                                          <p:spTgt spid="11"/>
-                                        </p:tgtEl>
-                                      </p:cBhvr>
-                                    </p:animEffect>
-                                  </p:childTnLst>
-                                </p:cTn>
-                              </p:par>
-                            </p:childTnLst>
-                          </p:cTn>
-                        </p:par>
-                      </p:childTnLst>
-                    </p:cTn>
-                  </p:par>
-                </p:childTnLst>
-              </p:cTn>
-              <p:prevCondLst>
-                <p:cond evt="onPrev" delay="0">
-                  <p:tgtEl>
-                    <p:sldTgt/>
-                  </p:tgtEl>
-                </p:cond>
-              </p:prevCondLst>
-              <p:nextCondLst>
-                <p:cond evt="onNext" delay="0">
-                  <p:tgtEl>
-                    <p:sldTgt/>
-                  </p:tgtEl>
-                </p:cond>
-              </p:nextCondLst>
-            </p:seq>
-          </p:childTnLst>
-        </p:cTn>
-      </p:par>
-    </p:tnLst>
-    <p:bldLst>
-      <p:bldP spid="7" grpId="0" uiExpand="1" build="p"/>
-    </p:bldLst>
-  </p:timing>
 </p:sld>
 </file>
 
@@ -9135,7 +8864,7 @@
         <p:spPr/>
         <p:txBody>
           <a:bodyPr>
-            <a:normAutofit/>
+            <a:normAutofit fontScale="92500" lnSpcReduction="20000"/>
           </a:bodyPr>
           <a:lstStyle/>
           <a:p>
@@ -9156,7 +8885,7 @@
           <a:p>
             <a:r>
               <a:rPr lang="pt-PT" sz="2400" dirty="0"/>
-              <a:t>Tranquilidade</a:t>
+              <a:t>Tranquilidade dos proprietários em relação a potênciais perigos</a:t>
             </a:r>
           </a:p>
           <a:p>
@@ -9168,13 +8897,13 @@
           <a:p>
             <a:r>
               <a:rPr lang="pt-PT" sz="2400" dirty="0"/>
-              <a:t>Acomodar as preferências do usuário</a:t>
+              <a:t>Acomodar as preferências do utilizador</a:t>
             </a:r>
           </a:p>
           <a:p>
             <a:r>
               <a:rPr lang="pt-PT" sz="2400" dirty="0"/>
-              <a:t>Melhorar a eficiência</a:t>
+              <a:t>Melhorar a eficiência da utilização de recursos naturais</a:t>
             </a:r>
           </a:p>
         </p:txBody>
@@ -9846,7 +9575,7 @@
                   <a:schemeClr val="tx1"/>
                 </a:solidFill>
               </a:rPr>
-              <a:t>Redutor de Estresse</a:t>
+              <a:t>Redutor de Stresse</a:t>
             </a:r>
           </a:p>
         </p:txBody>

</xml_diff>

<commit_message>
update Apresentação Individual - Ana
</commit_message>
<xml_diff>
--- a/Documentos/4. Apresentação Individual/Ana/Apresentação.pptx
+++ b/Documentos/4. Apresentação Individual/Ana/Apresentação.pptx
@@ -4,6 +4,9 @@
   <p:sldMasterIdLst>
     <p:sldMasterId id="2147483672" r:id="rId1"/>
   </p:sldMasterIdLst>
+  <p:notesMasterIdLst>
+    <p:notesMasterId r:id="rId10"/>
+  </p:notesMasterIdLst>
   <p:sldIdLst>
     <p:sldId id="256" r:id="rId2"/>
     <p:sldId id="257" r:id="rId3"/>
@@ -3701,6 +3704,440 @@
 </dgm:styleDef>
 </file>
 
+<file path=ppt/notesMasters/notesMaster1.xml><?xml version="1.0" encoding="utf-8"?>
+<p:notesMaster xmlns:a="http://schemas.openxmlformats.org/drawingml/2006/main" xmlns:r="http://schemas.openxmlformats.org/officeDocument/2006/relationships" xmlns:p="http://schemas.openxmlformats.org/presentationml/2006/main">
+  <p:cSld>
+    <p:bg>
+      <p:bgRef idx="1001">
+        <a:schemeClr val="bg1"/>
+      </p:bgRef>
+    </p:bg>
+    <p:spTree>
+      <p:nvGrpSpPr>
+        <p:cNvPr id="1" name=""/>
+        <p:cNvGrpSpPr/>
+        <p:nvPr/>
+      </p:nvGrpSpPr>
+      <p:grpSpPr>
+        <a:xfrm>
+          <a:off x="0" y="0"/>
+          <a:ext cx="0" cy="0"/>
+          <a:chOff x="0" y="0"/>
+          <a:chExt cx="0" cy="0"/>
+        </a:xfrm>
+      </p:grpSpPr>
+      <p:sp>
+        <p:nvSpPr>
+          <p:cNvPr id="2" name="Espaço Reservado para Cabeçalho 1"/>
+          <p:cNvSpPr>
+            <a:spLocks noGrp="1"/>
+          </p:cNvSpPr>
+          <p:nvPr>
+            <p:ph type="hdr" sz="quarter"/>
+          </p:nvPr>
+        </p:nvSpPr>
+        <p:spPr>
+          <a:xfrm>
+            <a:off x="0" y="0"/>
+            <a:ext cx="2971800" cy="458788"/>
+          </a:xfrm>
+          <a:prstGeom prst="rect">
+            <a:avLst/>
+          </a:prstGeom>
+        </p:spPr>
+        <p:txBody>
+          <a:bodyPr vert="horz" lIns="91440" tIns="45720" rIns="91440" bIns="45720" rtlCol="0"/>
+          <a:lstStyle>
+            <a:lvl1pPr algn="l">
+              <a:defRPr sz="1200"/>
+            </a:lvl1pPr>
+          </a:lstStyle>
+          <a:p>
+            <a:endParaRPr lang="pt-PT"/>
+          </a:p>
+        </p:txBody>
+      </p:sp>
+      <p:sp>
+        <p:nvSpPr>
+          <p:cNvPr id="3" name="Espaço Reservado para Data 2"/>
+          <p:cNvSpPr>
+            <a:spLocks noGrp="1"/>
+          </p:cNvSpPr>
+          <p:nvPr>
+            <p:ph type="dt" idx="1"/>
+          </p:nvPr>
+        </p:nvSpPr>
+        <p:spPr>
+          <a:xfrm>
+            <a:off x="3884613" y="0"/>
+            <a:ext cx="2971800" cy="458788"/>
+          </a:xfrm>
+          <a:prstGeom prst="rect">
+            <a:avLst/>
+          </a:prstGeom>
+        </p:spPr>
+        <p:txBody>
+          <a:bodyPr vert="horz" lIns="91440" tIns="45720" rIns="91440" bIns="45720" rtlCol="0"/>
+          <a:lstStyle>
+            <a:lvl1pPr algn="r">
+              <a:defRPr sz="1200"/>
+            </a:lvl1pPr>
+          </a:lstStyle>
+          <a:p>
+            <a:fld id="{90031D51-6943-4EC0-9136-2DD4B8784243}" type="datetimeFigureOut">
+              <a:rPr lang="pt-PT" smtClean="0"/>
+              <a:t>30/04/2018</a:t>
+            </a:fld>
+            <a:endParaRPr lang="pt-PT"/>
+          </a:p>
+        </p:txBody>
+      </p:sp>
+      <p:sp>
+        <p:nvSpPr>
+          <p:cNvPr id="4" name="Espaço Reservado para Imagem de Slide 3"/>
+          <p:cNvSpPr>
+            <a:spLocks noGrp="1" noRot="1" noChangeAspect="1"/>
+          </p:cNvSpPr>
+          <p:nvPr>
+            <p:ph type="sldImg" idx="2"/>
+          </p:nvPr>
+        </p:nvSpPr>
+        <p:spPr>
+          <a:xfrm>
+            <a:off x="1371600" y="1143000"/>
+            <a:ext cx="4114800" cy="3086100"/>
+          </a:xfrm>
+          <a:prstGeom prst="rect">
+            <a:avLst/>
+          </a:prstGeom>
+          <a:noFill/>
+          <a:ln w="12700">
+            <a:solidFill>
+              <a:prstClr val="black"/>
+            </a:solidFill>
+          </a:ln>
+        </p:spPr>
+        <p:txBody>
+          <a:bodyPr vert="horz" lIns="91440" tIns="45720" rIns="91440" bIns="45720" rtlCol="0" anchor="ctr"/>
+          <a:lstStyle/>
+          <a:p>
+            <a:endParaRPr lang="pt-PT"/>
+          </a:p>
+        </p:txBody>
+      </p:sp>
+      <p:sp>
+        <p:nvSpPr>
+          <p:cNvPr id="5" name="Espaço Reservado para Anotações 4"/>
+          <p:cNvSpPr>
+            <a:spLocks noGrp="1"/>
+          </p:cNvSpPr>
+          <p:nvPr>
+            <p:ph type="body" sz="quarter" idx="3"/>
+          </p:nvPr>
+        </p:nvSpPr>
+        <p:spPr>
+          <a:xfrm>
+            <a:off x="685800" y="4400550"/>
+            <a:ext cx="5486400" cy="3600450"/>
+          </a:xfrm>
+          <a:prstGeom prst="rect">
+            <a:avLst/>
+          </a:prstGeom>
+        </p:spPr>
+        <p:txBody>
+          <a:bodyPr vert="horz" lIns="91440" tIns="45720" rIns="91440" bIns="45720" rtlCol="0"/>
+          <a:lstStyle/>
+          <a:p>
+            <a:pPr lvl="0"/>
+            <a:r>
+              <a:rPr lang="pt-BR"/>
+              <a:t>Editar estilos de texto Mestre</a:t>
+            </a:r>
+          </a:p>
+          <a:p>
+            <a:pPr lvl="1"/>
+            <a:r>
+              <a:rPr lang="pt-BR"/>
+              <a:t>Segundo nível</a:t>
+            </a:r>
+          </a:p>
+          <a:p>
+            <a:pPr lvl="2"/>
+            <a:r>
+              <a:rPr lang="pt-BR"/>
+              <a:t>Terceiro nível</a:t>
+            </a:r>
+          </a:p>
+          <a:p>
+            <a:pPr lvl="3"/>
+            <a:r>
+              <a:rPr lang="pt-BR"/>
+              <a:t>Quarto nível</a:t>
+            </a:r>
+          </a:p>
+          <a:p>
+            <a:pPr lvl="4"/>
+            <a:r>
+              <a:rPr lang="pt-BR"/>
+              <a:t>Quinto nível</a:t>
+            </a:r>
+            <a:endParaRPr lang="pt-PT"/>
+          </a:p>
+        </p:txBody>
+      </p:sp>
+      <p:sp>
+        <p:nvSpPr>
+          <p:cNvPr id="6" name="Espaço Reservado para Rodapé 5"/>
+          <p:cNvSpPr>
+            <a:spLocks noGrp="1"/>
+          </p:cNvSpPr>
+          <p:nvPr>
+            <p:ph type="ftr" sz="quarter" idx="4"/>
+          </p:nvPr>
+        </p:nvSpPr>
+        <p:spPr>
+          <a:xfrm>
+            <a:off x="0" y="8685213"/>
+            <a:ext cx="2971800" cy="458787"/>
+          </a:xfrm>
+          <a:prstGeom prst="rect">
+            <a:avLst/>
+          </a:prstGeom>
+        </p:spPr>
+        <p:txBody>
+          <a:bodyPr vert="horz" lIns="91440" tIns="45720" rIns="91440" bIns="45720" rtlCol="0" anchor="b"/>
+          <a:lstStyle>
+            <a:lvl1pPr algn="l">
+              <a:defRPr sz="1200"/>
+            </a:lvl1pPr>
+          </a:lstStyle>
+          <a:p>
+            <a:endParaRPr lang="pt-PT"/>
+          </a:p>
+        </p:txBody>
+      </p:sp>
+      <p:sp>
+        <p:nvSpPr>
+          <p:cNvPr id="7" name="Espaço Reservado para Número de Slide 6"/>
+          <p:cNvSpPr>
+            <a:spLocks noGrp="1"/>
+          </p:cNvSpPr>
+          <p:nvPr>
+            <p:ph type="sldNum" sz="quarter" idx="5"/>
+          </p:nvPr>
+        </p:nvSpPr>
+        <p:spPr>
+          <a:xfrm>
+            <a:off x="3884613" y="8685213"/>
+            <a:ext cx="2971800" cy="458787"/>
+          </a:xfrm>
+          <a:prstGeom prst="rect">
+            <a:avLst/>
+          </a:prstGeom>
+        </p:spPr>
+        <p:txBody>
+          <a:bodyPr vert="horz" lIns="91440" tIns="45720" rIns="91440" bIns="45720" rtlCol="0" anchor="b"/>
+          <a:lstStyle>
+            <a:lvl1pPr algn="r">
+              <a:defRPr sz="1200"/>
+            </a:lvl1pPr>
+          </a:lstStyle>
+          <a:p>
+            <a:fld id="{308B012C-0F70-4969-933D-89CE2C0CAA8E}" type="slidenum">
+              <a:rPr lang="pt-PT" smtClean="0"/>
+              <a:t>‹nº›</a:t>
+            </a:fld>
+            <a:endParaRPr lang="pt-PT"/>
+          </a:p>
+        </p:txBody>
+      </p:sp>
+    </p:spTree>
+    <p:extLst>
+      <p:ext uri="{BB962C8B-B14F-4D97-AF65-F5344CB8AC3E}">
+        <p14:creationId xmlns:p14="http://schemas.microsoft.com/office/powerpoint/2010/main" val="3472809228"/>
+      </p:ext>
+    </p:extLst>
+  </p:cSld>
+  <p:clrMap bg1="lt1" tx1="dk1" bg2="lt2" tx2="dk2" accent1="accent1" accent2="accent2" accent3="accent3" accent4="accent4" accent5="accent5" accent6="accent6" hlink="hlink" folHlink="folHlink"/>
+  <p:notesStyle>
+    <a:lvl1pPr marL="0" algn="l" defTabSz="914400" rtl="0" eaLnBrk="1" latinLnBrk="0" hangingPunct="1">
+      <a:defRPr sz="1200" kern="1200">
+        <a:solidFill>
+          <a:schemeClr val="tx1"/>
+        </a:solidFill>
+        <a:latin typeface="+mn-lt"/>
+        <a:ea typeface="+mn-ea"/>
+        <a:cs typeface="+mn-cs"/>
+      </a:defRPr>
+    </a:lvl1pPr>
+    <a:lvl2pPr marL="457200" algn="l" defTabSz="914400" rtl="0" eaLnBrk="1" latinLnBrk="0" hangingPunct="1">
+      <a:defRPr sz="1200" kern="1200">
+        <a:solidFill>
+          <a:schemeClr val="tx1"/>
+        </a:solidFill>
+        <a:latin typeface="+mn-lt"/>
+        <a:ea typeface="+mn-ea"/>
+        <a:cs typeface="+mn-cs"/>
+      </a:defRPr>
+    </a:lvl2pPr>
+    <a:lvl3pPr marL="914400" algn="l" defTabSz="914400" rtl="0" eaLnBrk="1" latinLnBrk="0" hangingPunct="1">
+      <a:defRPr sz="1200" kern="1200">
+        <a:solidFill>
+          <a:schemeClr val="tx1"/>
+        </a:solidFill>
+        <a:latin typeface="+mn-lt"/>
+        <a:ea typeface="+mn-ea"/>
+        <a:cs typeface="+mn-cs"/>
+      </a:defRPr>
+    </a:lvl3pPr>
+    <a:lvl4pPr marL="1371600" algn="l" defTabSz="914400" rtl="0" eaLnBrk="1" latinLnBrk="0" hangingPunct="1">
+      <a:defRPr sz="1200" kern="1200">
+        <a:solidFill>
+          <a:schemeClr val="tx1"/>
+        </a:solidFill>
+        <a:latin typeface="+mn-lt"/>
+        <a:ea typeface="+mn-ea"/>
+        <a:cs typeface="+mn-cs"/>
+      </a:defRPr>
+    </a:lvl4pPr>
+    <a:lvl5pPr marL="1828800" algn="l" defTabSz="914400" rtl="0" eaLnBrk="1" latinLnBrk="0" hangingPunct="1">
+      <a:defRPr sz="1200" kern="1200">
+        <a:solidFill>
+          <a:schemeClr val="tx1"/>
+        </a:solidFill>
+        <a:latin typeface="+mn-lt"/>
+        <a:ea typeface="+mn-ea"/>
+        <a:cs typeface="+mn-cs"/>
+      </a:defRPr>
+    </a:lvl5pPr>
+    <a:lvl6pPr marL="2286000" algn="l" defTabSz="914400" rtl="0" eaLnBrk="1" latinLnBrk="0" hangingPunct="1">
+      <a:defRPr sz="1200" kern="1200">
+        <a:solidFill>
+          <a:schemeClr val="tx1"/>
+        </a:solidFill>
+        <a:latin typeface="+mn-lt"/>
+        <a:ea typeface="+mn-ea"/>
+        <a:cs typeface="+mn-cs"/>
+      </a:defRPr>
+    </a:lvl6pPr>
+    <a:lvl7pPr marL="2743200" algn="l" defTabSz="914400" rtl="0" eaLnBrk="1" latinLnBrk="0" hangingPunct="1">
+      <a:defRPr sz="1200" kern="1200">
+        <a:solidFill>
+          <a:schemeClr val="tx1"/>
+        </a:solidFill>
+        <a:latin typeface="+mn-lt"/>
+        <a:ea typeface="+mn-ea"/>
+        <a:cs typeface="+mn-cs"/>
+      </a:defRPr>
+    </a:lvl7pPr>
+    <a:lvl8pPr marL="3200400" algn="l" defTabSz="914400" rtl="0" eaLnBrk="1" latinLnBrk="0" hangingPunct="1">
+      <a:defRPr sz="1200" kern="1200">
+        <a:solidFill>
+          <a:schemeClr val="tx1"/>
+        </a:solidFill>
+        <a:latin typeface="+mn-lt"/>
+        <a:ea typeface="+mn-ea"/>
+        <a:cs typeface="+mn-cs"/>
+      </a:defRPr>
+    </a:lvl8pPr>
+    <a:lvl9pPr marL="3657600" algn="l" defTabSz="914400" rtl="0" eaLnBrk="1" latinLnBrk="0" hangingPunct="1">
+      <a:defRPr sz="1200" kern="1200">
+        <a:solidFill>
+          <a:schemeClr val="tx1"/>
+        </a:solidFill>
+        <a:latin typeface="+mn-lt"/>
+        <a:ea typeface="+mn-ea"/>
+        <a:cs typeface="+mn-cs"/>
+      </a:defRPr>
+    </a:lvl9pPr>
+  </p:notesStyle>
+</p:notesMaster>
+</file>
+
+<file path=ppt/notesSlides/notesSlide1.xml><?xml version="1.0" encoding="utf-8"?>
+<p:notes xmlns:a="http://schemas.openxmlformats.org/drawingml/2006/main" xmlns:r="http://schemas.openxmlformats.org/officeDocument/2006/relationships" xmlns:p="http://schemas.openxmlformats.org/presentationml/2006/main">
+  <p:cSld>
+    <p:spTree>
+      <p:nvGrpSpPr>
+        <p:cNvPr id="1" name=""/>
+        <p:cNvGrpSpPr/>
+        <p:nvPr/>
+      </p:nvGrpSpPr>
+      <p:grpSpPr>
+        <a:xfrm>
+          <a:off x="0" y="0"/>
+          <a:ext cx="0" cy="0"/>
+          <a:chOff x="0" y="0"/>
+          <a:chExt cx="0" cy="0"/>
+        </a:xfrm>
+      </p:grpSpPr>
+      <p:sp>
+        <p:nvSpPr>
+          <p:cNvPr id="2" name="Espaço Reservado para Imagem de Slide 1"/>
+          <p:cNvSpPr>
+            <a:spLocks noGrp="1" noRot="1" noChangeAspect="1"/>
+          </p:cNvSpPr>
+          <p:nvPr>
+            <p:ph type="sldImg"/>
+          </p:nvPr>
+        </p:nvSpPr>
+        <p:spPr/>
+      </p:sp>
+      <p:sp>
+        <p:nvSpPr>
+          <p:cNvPr id="3" name="Espaço Reservado para Anotações 2"/>
+          <p:cNvSpPr>
+            <a:spLocks noGrp="1"/>
+          </p:cNvSpPr>
+          <p:nvPr>
+            <p:ph type="body" idx="1"/>
+          </p:nvPr>
+        </p:nvSpPr>
+        <p:spPr/>
+        <p:txBody>
+          <a:bodyPr/>
+          <a:lstStyle/>
+          <a:p>
+            <a:endParaRPr lang="pt-PT" dirty="0"/>
+          </a:p>
+        </p:txBody>
+      </p:sp>
+      <p:sp>
+        <p:nvSpPr>
+          <p:cNvPr id="4" name="Espaço Reservado para Número de Slide 3"/>
+          <p:cNvSpPr>
+            <a:spLocks noGrp="1"/>
+          </p:cNvSpPr>
+          <p:nvPr>
+            <p:ph type="sldNum" sz="quarter" idx="10"/>
+          </p:nvPr>
+        </p:nvSpPr>
+        <p:spPr/>
+        <p:txBody>
+          <a:bodyPr/>
+          <a:lstStyle/>
+          <a:p>
+            <a:fld id="{308B012C-0F70-4969-933D-89CE2C0CAA8E}" type="slidenum">
+              <a:rPr lang="pt-PT" smtClean="0"/>
+              <a:t>1</a:t>
+            </a:fld>
+            <a:endParaRPr lang="pt-PT"/>
+          </a:p>
+        </p:txBody>
+      </p:sp>
+    </p:spTree>
+    <p:extLst>
+      <p:ext uri="{BB962C8B-B14F-4D97-AF65-F5344CB8AC3E}">
+        <p14:creationId xmlns:p14="http://schemas.microsoft.com/office/powerpoint/2010/main" val="2702640879"/>
+      </p:ext>
+    </p:extLst>
+  </p:cSld>
+  <p:clrMapOvr>
+    <a:masterClrMapping/>
+  </p:clrMapOvr>
+</p:notes>
+</file>
+
 <file path=ppt/slideLayouts/slideLayout1.xml><?xml version="1.0" encoding="utf-8"?>
 <p:sldLayout xmlns:a="http://schemas.openxmlformats.org/drawingml/2006/main" xmlns:r="http://schemas.openxmlformats.org/officeDocument/2006/relationships" xmlns:p="http://schemas.openxmlformats.org/presentationml/2006/main" type="title" preserve="1">
   <p:cSld name="Slide de Título">
@@ -3864,7 +4301,7 @@
           <a:p>
             <a:fld id="{86C5BD13-61EC-4414-AAF8-21C9A9ACCC39}" type="datetimeFigureOut">
               <a:rPr lang="pt-PT" smtClean="0"/>
-              <a:t>26/04/2018</a:t>
+              <a:t>30/04/2018</a:t>
             </a:fld>
             <a:endParaRPr lang="pt-PT"/>
           </a:p>
@@ -4034,7 +4471,7 @@
           <a:p>
             <a:fld id="{86C5BD13-61EC-4414-AAF8-21C9A9ACCC39}" type="datetimeFigureOut">
               <a:rPr lang="pt-PT" smtClean="0"/>
-              <a:t>26/04/2018</a:t>
+              <a:t>30/04/2018</a:t>
             </a:fld>
             <a:endParaRPr lang="pt-PT"/>
           </a:p>
@@ -4214,7 +4651,7 @@
           <a:p>
             <a:fld id="{86C5BD13-61EC-4414-AAF8-21C9A9ACCC39}" type="datetimeFigureOut">
               <a:rPr lang="pt-PT" smtClean="0"/>
-              <a:t>26/04/2018</a:t>
+              <a:t>30/04/2018</a:t>
             </a:fld>
             <a:endParaRPr lang="pt-PT"/>
           </a:p>
@@ -4384,7 +4821,7 @@
           <a:p>
             <a:fld id="{86C5BD13-61EC-4414-AAF8-21C9A9ACCC39}" type="datetimeFigureOut">
               <a:rPr lang="pt-PT" smtClean="0"/>
-              <a:t>26/04/2018</a:t>
+              <a:t>30/04/2018</a:t>
             </a:fld>
             <a:endParaRPr lang="pt-PT"/>
           </a:p>
@@ -4652,7 +5089,7 @@
           <a:p>
             <a:fld id="{86C5BD13-61EC-4414-AAF8-21C9A9ACCC39}" type="datetimeFigureOut">
               <a:rPr lang="pt-PT" smtClean="0"/>
-              <a:t>26/04/2018</a:t>
+              <a:t>30/04/2018</a:t>
             </a:fld>
             <a:endParaRPr lang="pt-PT"/>
           </a:p>
@@ -4884,7 +5321,7 @@
           <a:p>
             <a:fld id="{86C5BD13-61EC-4414-AAF8-21C9A9ACCC39}" type="datetimeFigureOut">
               <a:rPr lang="pt-PT" smtClean="0"/>
-              <a:t>26/04/2018</a:t>
+              <a:t>30/04/2018</a:t>
             </a:fld>
             <a:endParaRPr lang="pt-PT"/>
           </a:p>
@@ -5243,7 +5680,7 @@
           <a:p>
             <a:fld id="{86C5BD13-61EC-4414-AAF8-21C9A9ACCC39}" type="datetimeFigureOut">
               <a:rPr lang="pt-PT" smtClean="0"/>
-              <a:t>26/04/2018</a:t>
+              <a:t>30/04/2018</a:t>
             </a:fld>
             <a:endParaRPr lang="pt-PT"/>
           </a:p>
@@ -5384,7 +5821,7 @@
           <a:p>
             <a:fld id="{86C5BD13-61EC-4414-AAF8-21C9A9ACCC39}" type="datetimeFigureOut">
               <a:rPr lang="pt-PT" smtClean="0"/>
-              <a:t>26/04/2018</a:t>
+              <a:t>30/04/2018</a:t>
             </a:fld>
             <a:endParaRPr lang="pt-PT"/>
           </a:p>
@@ -5479,7 +5916,7 @@
           <a:p>
             <a:fld id="{86C5BD13-61EC-4414-AAF8-21C9A9ACCC39}" type="datetimeFigureOut">
               <a:rPr lang="pt-PT" smtClean="0"/>
-              <a:t>26/04/2018</a:t>
+              <a:t>30/04/2018</a:t>
             </a:fld>
             <a:endParaRPr lang="pt-PT"/>
           </a:p>
@@ -5836,7 +6273,7 @@
           <a:p>
             <a:fld id="{86C5BD13-61EC-4414-AAF8-21C9A9ACCC39}" type="datetimeFigureOut">
               <a:rPr lang="pt-PT" smtClean="0"/>
-              <a:t>26/04/2018</a:t>
+              <a:t>30/04/2018</a:t>
             </a:fld>
             <a:endParaRPr lang="pt-PT"/>
           </a:p>
@@ -6195,7 +6632,7 @@
           <a:p>
             <a:fld id="{86C5BD13-61EC-4414-AAF8-21C9A9ACCC39}" type="datetimeFigureOut">
               <a:rPr lang="pt-PT" smtClean="0"/>
-              <a:t>26/04/2018</a:t>
+              <a:t>30/04/2018</a:t>
             </a:fld>
             <a:endParaRPr lang="pt-PT"/>
           </a:p>
@@ -6438,7 +6875,7 @@
           <a:p>
             <a:fld id="{86C5BD13-61EC-4414-AAF8-21C9A9ACCC39}" type="datetimeFigureOut">
               <a:rPr lang="pt-PT" smtClean="0"/>
-              <a:t>26/04/2018</a:t>
+              <a:t>30/04/2018</a:t>
             </a:fld>
             <a:endParaRPr lang="pt-PT"/>
           </a:p>
@@ -7747,7 +8184,7 @@
                 </a:solidFill>
                 <a:latin typeface="Century Gothic" panose="020B0502020202020204" pitchFamily="34" charset="0"/>
               </a:rPr>
-              <a:t>    Matilde Pato | Nuno Datia		23/04/2018</a:t>
+              <a:t>    Matilde Pato | Nuno Datia		30/04/2018</a:t>
             </a:r>
             <a:endParaRPr lang="pt-PT" sz="1400" b="1" cap="all" spc="200" dirty="0">
               <a:solidFill>
@@ -7840,7 +8277,7 @@
           <p:nvPr/>
         </p:nvPicPr>
         <p:blipFill>
-          <a:blip r:embed="rId2">
+          <a:blip r:embed="rId3">
             <a:extLst>
               <a:ext uri="{28A0092B-C50C-407E-A947-70E740481C1C}">
                 <a14:useLocalDpi xmlns:a14="http://schemas.microsoft.com/office/drawing/2010/main" val="0"/>
@@ -8497,8 +8934,8 @@
         </p:nvSpPr>
         <p:spPr>
           <a:xfrm>
-            <a:off x="1606045" y="2638045"/>
-            <a:ext cx="5937755" cy="3101983"/>
+            <a:off x="1603122" y="2506031"/>
+            <a:ext cx="5937755" cy="1568195"/>
           </a:xfrm>
         </p:spPr>
         <p:txBody>
@@ -8511,42 +8948,49 @@
               <a:buNone/>
             </a:pPr>
             <a:r>
-              <a:rPr lang="pt-PT" sz="2000" dirty="0"/>
-              <a:t>Quando não nos encontramos em casa, pequenas dúvidas podem começar aparecer na nossa cabeça, como: </a:t>
+              <a:rPr lang="pt-PT" sz="2800" dirty="0"/>
+              <a:t>Conectar dispositivos e aparelhos para que eles possam comunicar uns com os outros e connosco.</a:t>
             </a:r>
-          </a:p>
-          <a:p>
-            <a:pPr marL="0" indent="0" algn="ctr">
-              <a:buNone/>
-            </a:pPr>
-            <a:endParaRPr lang="pt-PT" sz="1000" dirty="0"/>
-          </a:p>
-          <a:p>
-            <a:pPr marL="0" indent="0" algn="ctr">
-              <a:buNone/>
-            </a:pPr>
-            <a:r>
-              <a:rPr lang="pt-PT" sz="2400" dirty="0"/>
-              <a:t>“Desliguei o forno?”</a:t>
-            </a:r>
-          </a:p>
-          <a:p>
-            <a:pPr marL="0" indent="0" algn="ctr">
-              <a:buNone/>
-            </a:pPr>
-            <a:endParaRPr lang="pt-PT" sz="600" dirty="0"/>
-          </a:p>
-          <a:p>
-            <a:pPr marL="0" indent="0" algn="ctr">
-              <a:buNone/>
-            </a:pPr>
-            <a:r>
-              <a:rPr lang="pt-PT" sz="2400" dirty="0"/>
-              <a:t>“Tranquei a porta?”</a:t>
-            </a:r>
+            <a:endParaRPr lang="pt-PT" sz="3200" dirty="0"/>
           </a:p>
         </p:txBody>
       </p:sp>
+      <p:pic>
+        <p:nvPicPr>
+          <p:cNvPr id="4" name="Imagem 3">
+            <a:extLst>
+              <a:ext uri="{FF2B5EF4-FFF2-40B4-BE49-F238E27FC236}">
+                <a16:creationId xmlns:a16="http://schemas.microsoft.com/office/drawing/2014/main" id="{A24C4347-BAB7-447C-BA1E-2C4B2939E041}"/>
+              </a:ext>
+            </a:extLst>
+          </p:cNvPr>
+          <p:cNvPicPr>
+            <a:picLocks noChangeAspect="1"/>
+          </p:cNvPicPr>
+          <p:nvPr/>
+        </p:nvPicPr>
+        <p:blipFill>
+          <a:blip r:embed="rId2">
+            <a:extLst>
+              <a:ext uri="{28A0092B-C50C-407E-A947-70E740481C1C}">
+                <a14:useLocalDpi xmlns:a14="http://schemas.microsoft.com/office/drawing/2010/main" val="0"/>
+              </a:ext>
+            </a:extLst>
+          </a:blip>
+          <a:stretch>
+            <a:fillRect/>
+          </a:stretch>
+        </p:blipFill>
+        <p:spPr>
+          <a:xfrm>
+            <a:off x="1982453" y="4074226"/>
+            <a:ext cx="5179092" cy="2431153"/>
+          </a:xfrm>
+          <a:prstGeom prst="rect">
+            <a:avLst/>
+          </a:prstGeom>
+        </p:spPr>
+      </p:pic>
     </p:spTree>
     <p:extLst>
       <p:ext uri="{BB962C8B-B14F-4D97-AF65-F5344CB8AC3E}">
@@ -8864,7 +9308,7 @@
         <p:spPr/>
         <p:txBody>
           <a:bodyPr>
-            <a:normAutofit fontScale="92500" lnSpcReduction="20000"/>
+            <a:normAutofit lnSpcReduction="10000"/>
           </a:bodyPr>
           <a:lstStyle/>
           <a:p>
@@ -8873,7 +9317,7 @@
             </a:pPr>
             <a:r>
               <a:rPr lang="pt-PT" sz="2400" dirty="0"/>
-              <a:t>Benefícios:</a:t>
+              <a:t>Prós:</a:t>
             </a:r>
           </a:p>
           <a:p>
@@ -8885,13 +9329,7 @@
           <a:p>
             <a:r>
               <a:rPr lang="pt-PT" sz="2400" dirty="0"/>
-              <a:t>Tranquilidade dos proprietários em relação a potênciais perigos</a:t>
-            </a:r>
-          </a:p>
-          <a:p>
-            <a:r>
-              <a:rPr lang="pt-PT" sz="2400" dirty="0"/>
-              <a:t>Benéfico para idosos</a:t>
+              <a:t>Tranquilidade dos proprietários em relação a potenciais perigos</a:t>
             </a:r>
           </a:p>
           <a:p>
@@ -9068,7 +9506,7 @@
             </a:pPr>
             <a:r>
               <a:rPr lang="pt-PT" sz="2400" dirty="0"/>
-              <a:t>Desvantagens:</a:t>
+              <a:t>Contra:</a:t>
             </a:r>
           </a:p>
           <a:p>
@@ -9087,12 +9525,6 @@
             <a:r>
               <a:rPr lang="pt-PT" sz="2400" dirty="0"/>
               <a:t>Segurança</a:t>
-            </a:r>
-          </a:p>
-          <a:p>
-            <a:r>
-              <a:rPr lang="pt-PT" sz="2400" dirty="0"/>
-              <a:t>Privacidade de dados</a:t>
             </a:r>
           </a:p>
         </p:txBody>
@@ -9277,67 +9709,6 @@
       </p:pic>
       <p:sp>
         <p:nvSpPr>
-          <p:cNvPr id="19" name="Elipse 18">
-            <a:extLst>
-              <a:ext uri="{FF2B5EF4-FFF2-40B4-BE49-F238E27FC236}">
-                <a16:creationId xmlns:a16="http://schemas.microsoft.com/office/drawing/2014/main" id="{08DC3E9B-10C5-4A42-9BB7-62C849CCECB3}"/>
-              </a:ext>
-            </a:extLst>
-          </p:cNvPr>
-          <p:cNvSpPr/>
-          <p:nvPr/>
-        </p:nvSpPr>
-        <p:spPr>
-          <a:xfrm>
-            <a:off x="1200150" y="68975"/>
-            <a:ext cx="1796268" cy="509555"/>
-          </a:xfrm>
-          <a:prstGeom prst="ellipse">
-            <a:avLst/>
-          </a:prstGeom>
-          <a:solidFill>
-            <a:schemeClr val="bg1"/>
-          </a:solidFill>
-          <a:ln>
-            <a:solidFill>
-              <a:schemeClr val="tx1"/>
-            </a:solidFill>
-          </a:ln>
-        </p:spPr>
-        <p:style>
-          <a:lnRef idx="2">
-            <a:schemeClr val="accent1">
-              <a:shade val="50000"/>
-            </a:schemeClr>
-          </a:lnRef>
-          <a:fillRef idx="1">
-            <a:schemeClr val="accent1"/>
-          </a:fillRef>
-          <a:effectRef idx="0">
-            <a:schemeClr val="accent1"/>
-          </a:effectRef>
-          <a:fontRef idx="minor">
-            <a:schemeClr val="lt1"/>
-          </a:fontRef>
-        </p:style>
-        <p:txBody>
-          <a:bodyPr rtlCol="0" anchor="ctr"/>
-          <a:lstStyle/>
-          <a:p>
-            <a:pPr algn="ctr"/>
-            <a:r>
-              <a:rPr lang="pt-PT" sz="1400" b="1" dirty="0">
-                <a:solidFill>
-                  <a:schemeClr val="tx1"/>
-                </a:solidFill>
-              </a:rPr>
-              <a:t>Demografia</a:t>
-            </a:r>
-          </a:p>
-        </p:txBody>
-      </p:sp>
-      <p:sp>
-        <p:nvSpPr>
           <p:cNvPr id="20" name="Elipse 19">
             <a:extLst>
               <a:ext uri="{FF2B5EF4-FFF2-40B4-BE49-F238E27FC236}">
@@ -9350,7 +9721,7 @@
         </p:nvSpPr>
         <p:spPr>
           <a:xfrm>
-            <a:off x="126181" y="778631"/>
+            <a:off x="625359" y="207109"/>
             <a:ext cx="1796268" cy="626287"/>
           </a:xfrm>
           <a:prstGeom prst="ellipse">
@@ -9411,7 +9782,7 @@
         </p:nvSpPr>
         <p:spPr>
           <a:xfrm>
-            <a:off x="407963" y="1748987"/>
+            <a:off x="356765" y="1185205"/>
             <a:ext cx="1465181" cy="799646"/>
           </a:xfrm>
           <a:prstGeom prst="ellipse">
@@ -9472,7 +9843,7 @@
         </p:nvSpPr>
         <p:spPr>
           <a:xfrm>
-            <a:off x="6093566" y="31053"/>
+            <a:off x="6796746" y="548439"/>
             <a:ext cx="1177290" cy="770255"/>
           </a:xfrm>
           <a:prstGeom prst="ellipse">
@@ -9515,67 +9886,6 @@
                 </a:solidFill>
               </a:rPr>
               <a:t>Casas do futuro</a:t>
-            </a:r>
-          </a:p>
-        </p:txBody>
-      </p:sp>
-      <p:sp>
-        <p:nvSpPr>
-          <p:cNvPr id="23" name="Elipse 22">
-            <a:extLst>
-              <a:ext uri="{FF2B5EF4-FFF2-40B4-BE49-F238E27FC236}">
-                <a16:creationId xmlns:a16="http://schemas.microsoft.com/office/drawing/2014/main" id="{4EF06610-D504-497E-91C8-02CFCE091EA0}"/>
-              </a:ext>
-            </a:extLst>
-          </p:cNvPr>
-          <p:cNvSpPr/>
-          <p:nvPr/>
-        </p:nvSpPr>
-        <p:spPr>
-          <a:xfrm>
-            <a:off x="7134371" y="837026"/>
-            <a:ext cx="1348446" cy="770255"/>
-          </a:xfrm>
-          <a:prstGeom prst="ellipse">
-            <a:avLst/>
-          </a:prstGeom>
-          <a:solidFill>
-            <a:schemeClr val="bg1"/>
-          </a:solidFill>
-          <a:ln>
-            <a:solidFill>
-              <a:schemeClr val="tx1"/>
-            </a:solidFill>
-          </a:ln>
-        </p:spPr>
-        <p:style>
-          <a:lnRef idx="2">
-            <a:schemeClr val="accent1">
-              <a:shade val="50000"/>
-            </a:schemeClr>
-          </a:lnRef>
-          <a:fillRef idx="1">
-            <a:schemeClr val="accent1"/>
-          </a:fillRef>
-          <a:effectRef idx="0">
-            <a:schemeClr val="accent1"/>
-          </a:effectRef>
-          <a:fontRef idx="minor">
-            <a:schemeClr val="lt1"/>
-          </a:fontRef>
-        </p:style>
-        <p:txBody>
-          <a:bodyPr rtlCol="0" anchor="ctr"/>
-          <a:lstStyle/>
-          <a:p>
-            <a:pPr algn="ctr"/>
-            <a:r>
-              <a:rPr lang="pt-PT" sz="1400" b="1" dirty="0">
-                <a:solidFill>
-                  <a:schemeClr val="tx1"/>
-                </a:solidFill>
-              </a:rPr>
-              <a:t>Redutor de Stresse</a:t>
             </a:r>
           </a:p>
         </p:txBody>
@@ -9702,119 +10012,6 @@
           </a:p>
         </p:txBody>
       </p:sp>
-      <p:sp>
-        <p:nvSpPr>
-          <p:cNvPr id="26" name="Elipse 25">
-            <a:extLst>
-              <a:ext uri="{FF2B5EF4-FFF2-40B4-BE49-F238E27FC236}">
-                <a16:creationId xmlns:a16="http://schemas.microsoft.com/office/drawing/2014/main" id="{9EE83E0A-111D-4D1D-923F-F19C0A976851}"/>
-              </a:ext>
-            </a:extLst>
-          </p:cNvPr>
-          <p:cNvSpPr/>
-          <p:nvPr/>
-        </p:nvSpPr>
-        <p:spPr>
-          <a:xfrm>
-            <a:off x="6403861" y="2650370"/>
-            <a:ext cx="1792176" cy="522417"/>
-          </a:xfrm>
-          <a:prstGeom prst="ellipse">
-            <a:avLst/>
-          </a:prstGeom>
-          <a:solidFill>
-            <a:schemeClr val="bg1"/>
-          </a:solidFill>
-          <a:ln>
-            <a:solidFill>
-              <a:schemeClr val="tx1"/>
-            </a:solidFill>
-          </a:ln>
-        </p:spPr>
-        <p:style>
-          <a:lnRef idx="2">
-            <a:schemeClr val="accent1">
-              <a:shade val="50000"/>
-            </a:schemeClr>
-          </a:lnRef>
-          <a:fillRef idx="1">
-            <a:schemeClr val="accent1"/>
-          </a:fillRef>
-          <a:effectRef idx="0">
-            <a:schemeClr val="accent1"/>
-          </a:effectRef>
-          <a:fontRef idx="minor">
-            <a:schemeClr val="lt1"/>
-          </a:fontRef>
-        </p:style>
-        <p:txBody>
-          <a:bodyPr rtlCol="0" anchor="ctr"/>
-          <a:lstStyle/>
-          <a:p>
-            <a:pPr algn="ctr"/>
-            <a:r>
-              <a:rPr lang="pt-PT" sz="1400" b="1" dirty="0">
-                <a:solidFill>
-                  <a:schemeClr val="tx1"/>
-                </a:solidFill>
-              </a:rPr>
-              <a:t>Capacidades</a:t>
-            </a:r>
-          </a:p>
-        </p:txBody>
-      </p:sp>
-      <p:cxnSp>
-        <p:nvCxnSpPr>
-          <p:cNvPr id="28" name="Conector: Angulado 27">
-            <a:extLst>
-              <a:ext uri="{FF2B5EF4-FFF2-40B4-BE49-F238E27FC236}">
-                <a16:creationId xmlns:a16="http://schemas.microsoft.com/office/drawing/2014/main" id="{6A79F78E-906B-4943-B365-A9993DFA69AE}"/>
-              </a:ext>
-            </a:extLst>
-          </p:cNvPr>
-          <p:cNvCxnSpPr>
-            <a:cxnSpLocks/>
-            <a:stCxn id="19" idx="6"/>
-          </p:cNvCxnSpPr>
-          <p:nvPr/>
-        </p:nvCxnSpPr>
-        <p:spPr>
-          <a:xfrm>
-            <a:off x="2996418" y="323753"/>
-            <a:ext cx="731519" cy="208090"/>
-          </a:xfrm>
-          <a:prstGeom prst="bentConnector3">
-            <a:avLst>
-              <a:gd name="adj1" fmla="val 101923"/>
-            </a:avLst>
-          </a:prstGeom>
-          <a:ln w="22225">
-            <a:solidFill>
-              <a:schemeClr val="tx1">
-                <a:lumMod val="75000"/>
-                <a:lumOff val="25000"/>
-              </a:schemeClr>
-            </a:solidFill>
-            <a:prstDash val="sysDash"/>
-            <a:headEnd type="oval"/>
-            <a:tailEnd type="oval"/>
-          </a:ln>
-        </p:spPr>
-        <p:style>
-          <a:lnRef idx="1">
-            <a:schemeClr val="accent1"/>
-          </a:lnRef>
-          <a:fillRef idx="0">
-            <a:schemeClr val="accent1"/>
-          </a:fillRef>
-          <a:effectRef idx="0">
-            <a:schemeClr val="accent1"/>
-          </a:effectRef>
-          <a:fontRef idx="minor">
-            <a:schemeClr val="tx1"/>
-          </a:fontRef>
-        </p:style>
-      </p:cxnSp>
       <p:cxnSp>
         <p:nvCxnSpPr>
           <p:cNvPr id="34" name="Conector: Angulado 33">
@@ -9832,7 +10029,7 @@
         </p:nvCxnSpPr>
         <p:spPr>
           <a:xfrm flipV="1">
-            <a:off x="1922449" y="971259"/>
+            <a:off x="2421627" y="399737"/>
             <a:ext cx="1233673" cy="120516"/>
           </a:xfrm>
           <a:prstGeom prst="bentConnector3">
@@ -9884,7 +10081,7 @@
         </p:nvCxnSpPr>
         <p:spPr>
           <a:xfrm>
-            <a:off x="1873144" y="2148810"/>
+            <a:off x="1821946" y="1585028"/>
             <a:ext cx="1062145" cy="213074"/>
           </a:xfrm>
           <a:prstGeom prst="bentConnector3">
@@ -9942,58 +10139,6 @@
           <a:prstGeom prst="bentConnector3">
             <a:avLst>
               <a:gd name="adj1" fmla="val 16105"/>
-            </a:avLst>
-          </a:prstGeom>
-          <a:ln w="22225">
-            <a:solidFill>
-              <a:schemeClr val="tx1">
-                <a:lumMod val="75000"/>
-                <a:lumOff val="25000"/>
-              </a:schemeClr>
-            </a:solidFill>
-            <a:prstDash val="sysDash"/>
-            <a:headEnd type="oval"/>
-            <a:tailEnd type="oval"/>
-          </a:ln>
-        </p:spPr>
-        <p:style>
-          <a:lnRef idx="1">
-            <a:schemeClr val="accent1"/>
-          </a:lnRef>
-          <a:fillRef idx="0">
-            <a:schemeClr val="accent1"/>
-          </a:fillRef>
-          <a:effectRef idx="0">
-            <a:schemeClr val="accent1"/>
-          </a:effectRef>
-          <a:fontRef idx="minor">
-            <a:schemeClr val="tx1"/>
-          </a:fontRef>
-        </p:style>
-      </p:cxnSp>
-      <p:cxnSp>
-        <p:nvCxnSpPr>
-          <p:cNvPr id="49" name="Conector: Angulado 48">
-            <a:extLst>
-              <a:ext uri="{FF2B5EF4-FFF2-40B4-BE49-F238E27FC236}">
-                <a16:creationId xmlns:a16="http://schemas.microsoft.com/office/drawing/2014/main" id="{3D88F174-3441-4D2F-ADAB-EE7833BF6BED}"/>
-              </a:ext>
-            </a:extLst>
-          </p:cNvPr>
-          <p:cNvCxnSpPr>
-            <a:cxnSpLocks/>
-            <a:endCxn id="23" idx="2"/>
-          </p:cNvCxnSpPr>
-          <p:nvPr/>
-        </p:nvCxnSpPr>
-        <p:spPr>
-          <a:xfrm>
-            <a:off x="6147584" y="984740"/>
-            <a:ext cx="986787" cy="237414"/>
-          </a:xfrm>
-          <a:prstGeom prst="bentConnector3">
-            <a:avLst>
-              <a:gd name="adj1" fmla="val 50000"/>
             </a:avLst>
           </a:prstGeom>
           <a:ln w="22225">
@@ -10090,64 +10235,13 @@
           <p:nvPr/>
         </p:nvCxnSpPr>
         <p:spPr>
-          <a:xfrm flipV="1">
-            <a:off x="5416064" y="416181"/>
-            <a:ext cx="677502" cy="115662"/>
+          <a:xfrm>
+            <a:off x="5416062" y="548439"/>
+            <a:ext cx="1380684" cy="401407"/>
           </a:xfrm>
           <a:prstGeom prst="bentConnector3">
             <a:avLst>
-              <a:gd name="adj1" fmla="val 166"/>
-            </a:avLst>
-          </a:prstGeom>
-          <a:ln w="22225">
-            <a:solidFill>
-              <a:schemeClr val="tx1">
-                <a:lumMod val="75000"/>
-                <a:lumOff val="25000"/>
-              </a:schemeClr>
-            </a:solidFill>
-            <a:prstDash val="sysDash"/>
-            <a:headEnd type="oval"/>
-            <a:tailEnd type="oval"/>
-          </a:ln>
-        </p:spPr>
-        <p:style>
-          <a:lnRef idx="1">
-            <a:schemeClr val="accent1"/>
-          </a:lnRef>
-          <a:fillRef idx="0">
-            <a:schemeClr val="accent1"/>
-          </a:fillRef>
-          <a:effectRef idx="0">
-            <a:schemeClr val="accent1"/>
-          </a:effectRef>
-          <a:fontRef idx="minor">
-            <a:schemeClr val="tx1"/>
-          </a:fontRef>
-        </p:style>
-      </p:cxnSp>
-      <p:cxnSp>
-        <p:nvCxnSpPr>
-          <p:cNvPr id="65" name="Conector: Angulado 64">
-            <a:extLst>
-              <a:ext uri="{FF2B5EF4-FFF2-40B4-BE49-F238E27FC236}">
-                <a16:creationId xmlns:a16="http://schemas.microsoft.com/office/drawing/2014/main" id="{034AF19E-8920-41F3-B580-6D1AD32ECE09}"/>
-              </a:ext>
-            </a:extLst>
-          </p:cNvPr>
-          <p:cNvCxnSpPr>
-            <a:cxnSpLocks/>
-          </p:cNvCxnSpPr>
-          <p:nvPr/>
-        </p:nvCxnSpPr>
-        <p:spPr>
-          <a:xfrm flipV="1">
-            <a:off x="5416064" y="2932407"/>
-            <a:ext cx="987797" cy="484429"/>
-          </a:xfrm>
-          <a:prstGeom prst="bentConnector3">
-            <a:avLst>
-              <a:gd name="adj1" fmla="val 81331"/>
+              <a:gd name="adj1" fmla="val 50000"/>
             </a:avLst>
           </a:prstGeom>
           <a:ln w="22225">
@@ -10460,4 +10554,299 @@
     </a:ext>
   </a:extLst>
 </a:theme>
+</file>
+
+<file path=ppt/theme/theme2.xml><?xml version="1.0" encoding="utf-8"?>
+<a:theme xmlns:a="http://schemas.openxmlformats.org/drawingml/2006/main" name="Tema do Office">
+  <a:themeElements>
+    <a:clrScheme name="Office">
+      <a:dk1>
+        <a:sysClr val="windowText" lastClr="000000"/>
+      </a:dk1>
+      <a:lt1>
+        <a:sysClr val="window" lastClr="FFFFFF"/>
+      </a:lt1>
+      <a:dk2>
+        <a:srgbClr val="44546A"/>
+      </a:dk2>
+      <a:lt2>
+        <a:srgbClr val="E7E6E6"/>
+      </a:lt2>
+      <a:accent1>
+        <a:srgbClr val="4472C4"/>
+      </a:accent1>
+      <a:accent2>
+        <a:srgbClr val="ED7D31"/>
+      </a:accent2>
+      <a:accent3>
+        <a:srgbClr val="A5A5A5"/>
+      </a:accent3>
+      <a:accent4>
+        <a:srgbClr val="FFC000"/>
+      </a:accent4>
+      <a:accent5>
+        <a:srgbClr val="5B9BD5"/>
+      </a:accent5>
+      <a:accent6>
+        <a:srgbClr val="70AD47"/>
+      </a:accent6>
+      <a:hlink>
+        <a:srgbClr val="0563C1"/>
+      </a:hlink>
+      <a:folHlink>
+        <a:srgbClr val="954F72"/>
+      </a:folHlink>
+    </a:clrScheme>
+    <a:fontScheme name="Office">
+      <a:majorFont>
+        <a:latin typeface="Calibri Light" panose="020F0302020204030204"/>
+        <a:ea typeface=""/>
+        <a:cs typeface=""/>
+        <a:font script="Jpan" typeface="游ゴシック Light"/>
+        <a:font script="Hang" typeface="맑은 고딕"/>
+        <a:font script="Hans" typeface="等线 Light"/>
+        <a:font script="Hant" typeface="新細明體"/>
+        <a:font script="Arab" typeface="Times New Roman"/>
+        <a:font script="Hebr" typeface="Times New Roman"/>
+        <a:font script="Thai" typeface="Angsana New"/>
+        <a:font script="Ethi" typeface="Nyala"/>
+        <a:font script="Beng" typeface="Vrinda"/>
+        <a:font script="Gujr" typeface="Shruti"/>
+        <a:font script="Khmr" typeface="MoolBoran"/>
+        <a:font script="Knda" typeface="Tunga"/>
+        <a:font script="Guru" typeface="Raavi"/>
+        <a:font script="Cans" typeface="Euphemia"/>
+        <a:font script="Cher" typeface="Plantagenet Cherokee"/>
+        <a:font script="Yiii" typeface="Microsoft Yi Baiti"/>
+        <a:font script="Tibt" typeface="Microsoft Himalaya"/>
+        <a:font script="Thaa" typeface="MV Boli"/>
+        <a:font script="Deva" typeface="Mangal"/>
+        <a:font script="Telu" typeface="Gautami"/>
+        <a:font script="Taml" typeface="Latha"/>
+        <a:font script="Syrc" typeface="Estrangelo Edessa"/>
+        <a:font script="Orya" typeface="Kalinga"/>
+        <a:font script="Mlym" typeface="Kartika"/>
+        <a:font script="Laoo" typeface="DokChampa"/>
+        <a:font script="Sinh" typeface="Iskoola Pota"/>
+        <a:font script="Mong" typeface="Mongolian Baiti"/>
+        <a:font script="Viet" typeface="Times New Roman"/>
+        <a:font script="Uigh" typeface="Microsoft Uighur"/>
+        <a:font script="Geor" typeface="Sylfaen"/>
+        <a:font script="Armn" typeface="Arial"/>
+        <a:font script="Bugi" typeface="Leelawadee UI"/>
+        <a:font script="Bopo" typeface="Microsoft JhengHei"/>
+        <a:font script="Java" typeface="Javanese Text"/>
+        <a:font script="Lisu" typeface="Segoe UI"/>
+        <a:font script="Mymr" typeface="Myanmar Text"/>
+        <a:font script="Nkoo" typeface="Ebrima"/>
+        <a:font script="Olck" typeface="Nirmala UI"/>
+        <a:font script="Osma" typeface="Ebrima"/>
+        <a:font script="Phag" typeface="Phagspa"/>
+        <a:font script="Syrn" typeface="Estrangelo Edessa"/>
+        <a:font script="Syrj" typeface="Estrangelo Edessa"/>
+        <a:font script="Syre" typeface="Estrangelo Edessa"/>
+        <a:font script="Sora" typeface="Nirmala UI"/>
+        <a:font script="Tale" typeface="Microsoft Tai Le"/>
+        <a:font script="Talu" typeface="Microsoft New Tai Lue"/>
+        <a:font script="Tfng" typeface="Ebrima"/>
+      </a:majorFont>
+      <a:minorFont>
+        <a:latin typeface="Calibri" panose="020F0502020204030204"/>
+        <a:ea typeface=""/>
+        <a:cs typeface=""/>
+        <a:font script="Jpan" typeface="游ゴシック"/>
+        <a:font script="Hang" typeface="맑은 고딕"/>
+        <a:font script="Hans" typeface="等线"/>
+        <a:font script="Hant" typeface="新細明體"/>
+        <a:font script="Arab" typeface="Arial"/>
+        <a:font script="Hebr" typeface="Arial"/>
+        <a:font script="Thai" typeface="Cordia New"/>
+        <a:font script="Ethi" typeface="Nyala"/>
+        <a:font script="Beng" typeface="Vrinda"/>
+        <a:font script="Gujr" typeface="Shruti"/>
+        <a:font script="Khmr" typeface="DaunPenh"/>
+        <a:font script="Knda" typeface="Tunga"/>
+        <a:font script="Guru" typeface="Raavi"/>
+        <a:font script="Cans" typeface="Euphemia"/>
+        <a:font script="Cher" typeface="Plantagenet Cherokee"/>
+        <a:font script="Yiii" typeface="Microsoft Yi Baiti"/>
+        <a:font script="Tibt" typeface="Microsoft Himalaya"/>
+        <a:font script="Thaa" typeface="MV Boli"/>
+        <a:font script="Deva" typeface="Mangal"/>
+        <a:font script="Telu" typeface="Gautami"/>
+        <a:font script="Taml" typeface="Latha"/>
+        <a:font script="Syrc" typeface="Estrangelo Edessa"/>
+        <a:font script="Orya" typeface="Kalinga"/>
+        <a:font script="Mlym" typeface="Kartika"/>
+        <a:font script="Laoo" typeface="DokChampa"/>
+        <a:font script="Sinh" typeface="Iskoola Pota"/>
+        <a:font script="Mong" typeface="Mongolian Baiti"/>
+        <a:font script="Viet" typeface="Arial"/>
+        <a:font script="Uigh" typeface="Microsoft Uighur"/>
+        <a:font script="Geor" typeface="Sylfaen"/>
+        <a:font script="Armn" typeface="Arial"/>
+        <a:font script="Bugi" typeface="Leelawadee UI"/>
+        <a:font script="Bopo" typeface="Microsoft JhengHei"/>
+        <a:font script="Java" typeface="Javanese Text"/>
+        <a:font script="Lisu" typeface="Segoe UI"/>
+        <a:font script="Mymr" typeface="Myanmar Text"/>
+        <a:font script="Nkoo" typeface="Ebrima"/>
+        <a:font script="Olck" typeface="Nirmala UI"/>
+        <a:font script="Osma" typeface="Ebrima"/>
+        <a:font script="Phag" typeface="Phagspa"/>
+        <a:font script="Syrn" typeface="Estrangelo Edessa"/>
+        <a:font script="Syrj" typeface="Estrangelo Edessa"/>
+        <a:font script="Syre" typeface="Estrangelo Edessa"/>
+        <a:font script="Sora" typeface="Nirmala UI"/>
+        <a:font script="Tale" typeface="Microsoft Tai Le"/>
+        <a:font script="Talu" typeface="Microsoft New Tai Lue"/>
+        <a:font script="Tfng" typeface="Ebrima"/>
+      </a:minorFont>
+    </a:fontScheme>
+    <a:fmtScheme name="Office">
+      <a:fillStyleLst>
+        <a:solidFill>
+          <a:schemeClr val="phClr"/>
+        </a:solidFill>
+        <a:gradFill rotWithShape="1">
+          <a:gsLst>
+            <a:gs pos="0">
+              <a:schemeClr val="phClr">
+                <a:lumMod val="110000"/>
+                <a:satMod val="105000"/>
+                <a:tint val="67000"/>
+              </a:schemeClr>
+            </a:gs>
+            <a:gs pos="50000">
+              <a:schemeClr val="phClr">
+                <a:lumMod val="105000"/>
+                <a:satMod val="103000"/>
+                <a:tint val="73000"/>
+              </a:schemeClr>
+            </a:gs>
+            <a:gs pos="100000">
+              <a:schemeClr val="phClr">
+                <a:lumMod val="105000"/>
+                <a:satMod val="109000"/>
+                <a:tint val="81000"/>
+              </a:schemeClr>
+            </a:gs>
+          </a:gsLst>
+          <a:lin ang="5400000" scaled="0"/>
+        </a:gradFill>
+        <a:gradFill rotWithShape="1">
+          <a:gsLst>
+            <a:gs pos="0">
+              <a:schemeClr val="phClr">
+                <a:satMod val="103000"/>
+                <a:lumMod val="102000"/>
+                <a:tint val="94000"/>
+              </a:schemeClr>
+            </a:gs>
+            <a:gs pos="50000">
+              <a:schemeClr val="phClr">
+                <a:satMod val="110000"/>
+                <a:lumMod val="100000"/>
+                <a:shade val="100000"/>
+              </a:schemeClr>
+            </a:gs>
+            <a:gs pos="100000">
+              <a:schemeClr val="phClr">
+                <a:lumMod val="99000"/>
+                <a:satMod val="120000"/>
+                <a:shade val="78000"/>
+              </a:schemeClr>
+            </a:gs>
+          </a:gsLst>
+          <a:lin ang="5400000" scaled="0"/>
+        </a:gradFill>
+      </a:fillStyleLst>
+      <a:lnStyleLst>
+        <a:ln w="6350" cap="flat" cmpd="sng" algn="ctr">
+          <a:solidFill>
+            <a:schemeClr val="phClr"/>
+          </a:solidFill>
+          <a:prstDash val="solid"/>
+          <a:miter lim="800000"/>
+        </a:ln>
+        <a:ln w="12700" cap="flat" cmpd="sng" algn="ctr">
+          <a:solidFill>
+            <a:schemeClr val="phClr"/>
+          </a:solidFill>
+          <a:prstDash val="solid"/>
+          <a:miter lim="800000"/>
+        </a:ln>
+        <a:ln w="19050" cap="flat" cmpd="sng" algn="ctr">
+          <a:solidFill>
+            <a:schemeClr val="phClr"/>
+          </a:solidFill>
+          <a:prstDash val="solid"/>
+          <a:miter lim="800000"/>
+        </a:ln>
+      </a:lnStyleLst>
+      <a:effectStyleLst>
+        <a:effectStyle>
+          <a:effectLst/>
+        </a:effectStyle>
+        <a:effectStyle>
+          <a:effectLst/>
+        </a:effectStyle>
+        <a:effectStyle>
+          <a:effectLst>
+            <a:outerShdw blurRad="57150" dist="19050" dir="5400000" algn="ctr" rotWithShape="0">
+              <a:srgbClr val="000000">
+                <a:alpha val="63000"/>
+              </a:srgbClr>
+            </a:outerShdw>
+          </a:effectLst>
+        </a:effectStyle>
+      </a:effectStyleLst>
+      <a:bgFillStyleLst>
+        <a:solidFill>
+          <a:schemeClr val="phClr"/>
+        </a:solidFill>
+        <a:solidFill>
+          <a:schemeClr val="phClr">
+            <a:tint val="95000"/>
+            <a:satMod val="170000"/>
+          </a:schemeClr>
+        </a:solidFill>
+        <a:gradFill rotWithShape="1">
+          <a:gsLst>
+            <a:gs pos="0">
+              <a:schemeClr val="phClr">
+                <a:tint val="93000"/>
+                <a:satMod val="150000"/>
+                <a:shade val="98000"/>
+                <a:lumMod val="102000"/>
+              </a:schemeClr>
+            </a:gs>
+            <a:gs pos="50000">
+              <a:schemeClr val="phClr">
+                <a:tint val="98000"/>
+                <a:satMod val="130000"/>
+                <a:shade val="90000"/>
+                <a:lumMod val="103000"/>
+              </a:schemeClr>
+            </a:gs>
+            <a:gs pos="100000">
+              <a:schemeClr val="phClr">
+                <a:shade val="63000"/>
+                <a:satMod val="120000"/>
+              </a:schemeClr>
+            </a:gs>
+          </a:gsLst>
+          <a:lin ang="5400000" scaled="0"/>
+        </a:gradFill>
+      </a:bgFillStyleLst>
+    </a:fmtScheme>
+  </a:themeElements>
+  <a:objectDefaults/>
+  <a:extraClrSchemeLst/>
+  <a:extLst>
+    <a:ext uri="{05A4C25C-085E-4340-85A3-A5531E510DB2}">
+      <thm15:themeFamily xmlns:thm15="http://schemas.microsoft.com/office/thememl/2012/main" name="Office Theme" id="{62F939B6-93AF-4DB8-9C6B-D6C7DFDC589F}" vid="{4A3C46E8-61CC-4603-A589-7422A47A8E4A}"/>
+    </a:ext>
+  </a:extLst>
+</a:theme>
 </file>
</xml_diff>